<commit_message>
update Storage Component Class diagream
</commit_message>
<xml_diff>
--- a/docs/diagrams/StorageComponentClassDiagram.pptx
+++ b/docs/diagrams/StorageComponentClassDiagram.pptx
@@ -208,7 +208,7 @@
           <a:p>
             <a:fld id="{F5CC4B3F-88C1-4FFA-B1B6-F41C21DC6924}" type="datetimeFigureOut">
               <a:rPr lang="en-US" smtClean="0"/>
-              <a:t>12/1/2018</a:t>
+              <a:t>4/15/19</a:t>
             </a:fld>
             <a:endParaRPr lang="en-US"/>
           </a:p>
@@ -654,7 +654,7 @@
           <a:p>
             <a:fld id="{78C97017-6FC3-485B-9764-EAC9E56C1D49}" type="datetimeFigureOut">
               <a:rPr lang="en-US" smtClean="0"/>
-              <a:t>12/1/2018</a:t>
+              <a:t>4/15/19</a:t>
             </a:fld>
             <a:endParaRPr lang="en-US"/>
           </a:p>
@@ -822,7 +822,7 @@
           <a:p>
             <a:fld id="{78C97017-6FC3-485B-9764-EAC9E56C1D49}" type="datetimeFigureOut">
               <a:rPr lang="en-US" smtClean="0"/>
-              <a:t>12/1/2018</a:t>
+              <a:t>4/15/19</a:t>
             </a:fld>
             <a:endParaRPr lang="en-US"/>
           </a:p>
@@ -1000,7 +1000,7 @@
           <a:p>
             <a:fld id="{78C97017-6FC3-485B-9764-EAC9E56C1D49}" type="datetimeFigureOut">
               <a:rPr lang="en-US" smtClean="0"/>
-              <a:t>12/1/2018</a:t>
+              <a:t>4/15/19</a:t>
             </a:fld>
             <a:endParaRPr lang="en-US"/>
           </a:p>
@@ -1168,7 +1168,7 @@
           <a:p>
             <a:fld id="{78C97017-6FC3-485B-9764-EAC9E56C1D49}" type="datetimeFigureOut">
               <a:rPr lang="en-US" smtClean="0"/>
-              <a:t>12/1/2018</a:t>
+              <a:t>4/15/19</a:t>
             </a:fld>
             <a:endParaRPr lang="en-US"/>
           </a:p>
@@ -1413,7 +1413,7 @@
           <a:p>
             <a:fld id="{78C97017-6FC3-485B-9764-EAC9E56C1D49}" type="datetimeFigureOut">
               <a:rPr lang="en-US" smtClean="0"/>
-              <a:t>12/1/2018</a:t>
+              <a:t>4/15/19</a:t>
             </a:fld>
             <a:endParaRPr lang="en-US"/>
           </a:p>
@@ -1698,7 +1698,7 @@
           <a:p>
             <a:fld id="{78C97017-6FC3-485B-9764-EAC9E56C1D49}" type="datetimeFigureOut">
               <a:rPr lang="en-US" smtClean="0"/>
-              <a:t>12/1/2018</a:t>
+              <a:t>4/15/19</a:t>
             </a:fld>
             <a:endParaRPr lang="en-US"/>
           </a:p>
@@ -2117,7 +2117,7 @@
           <a:p>
             <a:fld id="{78C97017-6FC3-485B-9764-EAC9E56C1D49}" type="datetimeFigureOut">
               <a:rPr lang="en-US" smtClean="0"/>
-              <a:t>12/1/2018</a:t>
+              <a:t>4/15/19</a:t>
             </a:fld>
             <a:endParaRPr lang="en-US"/>
           </a:p>
@@ -2234,7 +2234,7 @@
           <a:p>
             <a:fld id="{78C97017-6FC3-485B-9764-EAC9E56C1D49}" type="datetimeFigureOut">
               <a:rPr lang="en-US" smtClean="0"/>
-              <a:t>12/1/2018</a:t>
+              <a:t>4/15/19</a:t>
             </a:fld>
             <a:endParaRPr lang="en-US"/>
           </a:p>
@@ -2329,7 +2329,7 @@
           <a:p>
             <a:fld id="{78C97017-6FC3-485B-9764-EAC9E56C1D49}" type="datetimeFigureOut">
               <a:rPr lang="en-US" smtClean="0"/>
-              <a:t>12/1/2018</a:t>
+              <a:t>4/15/19</a:t>
             </a:fld>
             <a:endParaRPr lang="en-US"/>
           </a:p>
@@ -2604,7 +2604,7 @@
           <a:p>
             <a:fld id="{78C97017-6FC3-485B-9764-EAC9E56C1D49}" type="datetimeFigureOut">
               <a:rPr lang="en-US" smtClean="0"/>
-              <a:t>12/1/2018</a:t>
+              <a:t>4/15/19</a:t>
             </a:fld>
             <a:endParaRPr lang="en-US"/>
           </a:p>
@@ -2856,7 +2856,7 @@
           <a:p>
             <a:fld id="{78C97017-6FC3-485B-9764-EAC9E56C1D49}" type="datetimeFigureOut">
               <a:rPr lang="en-US" smtClean="0"/>
-              <a:t>12/1/2018</a:t>
+              <a:t>4/15/19</a:t>
             </a:fld>
             <a:endParaRPr lang="en-US"/>
           </a:p>
@@ -3067,7 +3067,7 @@
           <a:p>
             <a:fld id="{78C97017-6FC3-485B-9764-EAC9E56C1D49}" type="datetimeFigureOut">
               <a:rPr lang="en-US" smtClean="0"/>
-              <a:t>12/1/2018</a:t>
+              <a:t>4/15/19</a:t>
             </a:fld>
             <a:endParaRPr lang="en-US"/>
           </a:p>
@@ -3450,12 +3450,12 @@
         </p:nvSpPr>
         <p:spPr>
           <a:xfrm>
-            <a:off x="1119865" y="2086382"/>
-            <a:ext cx="7871735" cy="1723618"/>
+            <a:off x="990600" y="76200"/>
+            <a:ext cx="8011666" cy="3886199"/>
           </a:xfrm>
           <a:prstGeom prst="roundRect">
             <a:avLst>
-              <a:gd name="adj" fmla="val 3484"/>
+              <a:gd name="adj" fmla="val 8021"/>
             </a:avLst>
           </a:prstGeom>
           <a:solidFill>
@@ -3515,8 +3515,8 @@
         </p:nvSpPr>
         <p:spPr>
           <a:xfrm>
-            <a:off x="2877180" y="3158440"/>
-            <a:ext cx="1323049" cy="346760"/>
+            <a:off x="2877180" y="3072896"/>
+            <a:ext cx="1323049" cy="508504"/>
           </a:xfrm>
           <a:prstGeom prst="rect">
             <a:avLst/>
@@ -3570,12 +3570,12 @@
               </a:rPr>
             </a:br>
             <a:r>
-              <a:rPr lang="en-US" sz="1050" dirty="0" err="1">
+              <a:rPr lang="en-US" sz="1050" dirty="0">
                 <a:solidFill>
                   <a:schemeClr val="bg1"/>
                 </a:solidFill>
               </a:rPr>
-              <a:t>AddressBookStorage</a:t>
+              <a:t>SourceManagerStorage</a:t>
             </a:r>
             <a:endParaRPr lang="en-SG" sz="1050" dirty="0">
               <a:solidFill>
@@ -3593,8 +3593,8 @@
         </p:nvSpPr>
         <p:spPr>
           <a:xfrm rot="16200000">
-            <a:off x="1683963" y="2868687"/>
-            <a:ext cx="1093635" cy="346760"/>
+            <a:off x="1409753" y="2594477"/>
+            <a:ext cx="1642056" cy="346760"/>
           </a:xfrm>
           <a:prstGeom prst="rect">
             <a:avLst/>
@@ -3781,6 +3781,7 @@
         <p:nvCxnSpPr>
           <p:cNvPr id="58" name="Straight Arrow Connector 57"/>
           <p:cNvCxnSpPr>
+            <a:cxnSpLocks/>
             <a:stCxn id="42" idx="3"/>
             <a:endCxn id="2" idx="1"/>
           </p:cNvCxnSpPr>
@@ -3789,7 +3790,7 @@
         <p:spPr>
           <a:xfrm>
             <a:off x="2656370" y="3326536"/>
-            <a:ext cx="220810" cy="5284"/>
+            <a:ext cx="220810" cy="612"/>
           </a:xfrm>
           <a:prstGeom prst="straightConnector1">
             <a:avLst/>
@@ -3823,13 +3824,15 @@
       <p:cxnSp>
         <p:nvCxnSpPr>
           <p:cNvPr id="75" name="Elbow Connector 122"/>
-          <p:cNvCxnSpPr/>
+          <p:cNvCxnSpPr>
+            <a:cxnSpLocks/>
+          </p:cNvCxnSpPr>
           <p:nvPr/>
         </p:nvCxnSpPr>
         <p:spPr>
           <a:xfrm>
-            <a:off x="910091" y="3040053"/>
-            <a:ext cx="419548" cy="2860"/>
+            <a:off x="1060419" y="3042913"/>
+            <a:ext cx="269220" cy="12700"/>
           </a:xfrm>
           <a:prstGeom prst="bentConnector3">
             <a:avLst>
@@ -4148,7 +4151,7 @@
                   </a:schemeClr>
                 </a:solidFill>
               </a:rPr>
-              <a:t>JsonAddressBook</a:t>
+              <a:t>SourceManager</a:t>
             </a:r>
             <a:br>
               <a:rPr lang="en-US" sz="1050" b="1" dirty="0">
@@ -4593,7 +4596,7 @@
                   </a:schemeClr>
                 </a:solidFill>
               </a:rPr>
-              <a:t>AddressBook</a:t>
+              <a:t>SourceManager</a:t>
             </a:r>
             <a:endParaRPr lang="en-SG" sz="1050" b="1" dirty="0">
               <a:solidFill>
@@ -4611,14 +4614,13 @@
           <p:cNvCxnSpPr>
             <a:cxnSpLocks/>
             <a:stCxn id="74" idx="0"/>
-            <a:endCxn id="73" idx="2"/>
           </p:cNvCxnSpPr>
           <p:nvPr/>
         </p:nvCxnSpPr>
         <p:spPr>
-          <a:xfrm rot="16200000" flipV="1">
-            <a:off x="8077993" y="2992019"/>
-            <a:ext cx="335208" cy="1"/>
+          <a:xfrm rot="5400000" flipH="1" flipV="1">
+            <a:off x="8118185" y="3032212"/>
+            <a:ext cx="254824" cy="1"/>
           </a:xfrm>
           <a:prstGeom prst="bentConnector3">
             <a:avLst>
@@ -4655,7 +4657,7 @@
         </p:nvSpPr>
         <p:spPr>
           <a:xfrm>
-            <a:off x="7615736" y="2477656"/>
+            <a:off x="7622364" y="2564997"/>
             <a:ext cx="1259719" cy="346760"/>
           </a:xfrm>
           <a:prstGeom prst="rect">
@@ -4747,7 +4749,7 @@
                   </a:schemeClr>
                 </a:solidFill>
               </a:rPr>
-              <a:t>JsonAdaptedPerson</a:t>
+              <a:t>JsonAdaptedSource</a:t>
             </a:r>
             <a:endParaRPr lang="en-SG" sz="1030" b="1" dirty="0">
               <a:solidFill>
@@ -4794,6 +4796,874 @@
           </a:fillRef>
           <a:effectRef idx="1">
             <a:schemeClr val="accent6"/>
+          </a:effectRef>
+          <a:fontRef idx="minor">
+            <a:schemeClr val="dk1"/>
+          </a:fontRef>
+        </p:style>
+      </p:cxnSp>
+      <p:sp>
+        <p:nvSpPr>
+          <p:cNvPr id="28" name="Rectangle 62">
+            <a:extLst>
+              <a:ext uri="{FF2B5EF4-FFF2-40B4-BE49-F238E27FC236}">
+                <a16:creationId xmlns:a16="http://schemas.microsoft.com/office/drawing/2014/main" id="{04E53102-AD91-2E42-94FF-43234703C0BF}"/>
+              </a:ext>
+            </a:extLst>
+          </p:cNvPr>
+          <p:cNvSpPr/>
+          <p:nvPr/>
+        </p:nvSpPr>
+        <p:spPr>
+          <a:xfrm rot="16200000">
+            <a:off x="998163" y="820536"/>
+            <a:ext cx="1093635" cy="346760"/>
+          </a:xfrm>
+          <a:prstGeom prst="rect">
+            <a:avLst/>
+          </a:prstGeom>
+          <a:solidFill>
+            <a:schemeClr val="accent6">
+              <a:lumMod val="75000"/>
+            </a:schemeClr>
+          </a:solidFill>
+          <a:ln w="19050">
+            <a:solidFill>
+              <a:schemeClr val="accent6">
+                <a:lumMod val="75000"/>
+              </a:schemeClr>
+            </a:solidFill>
+          </a:ln>
+          <a:effectLst/>
+        </p:spPr>
+        <p:style>
+          <a:lnRef idx="1">
+            <a:schemeClr val="accent2"/>
+          </a:lnRef>
+          <a:fillRef idx="2">
+            <a:schemeClr val="accent2"/>
+          </a:fillRef>
+          <a:effectRef idx="1">
+            <a:schemeClr val="accent2"/>
+          </a:effectRef>
+          <a:fontRef idx="minor">
+            <a:schemeClr val="dk1"/>
+          </a:fontRef>
+        </p:style>
+        <p:txBody>
+          <a:bodyPr rtlCol="0" anchor="ctr"/>
+          <a:lstStyle/>
+          <a:p>
+            <a:pPr algn="ctr"/>
+            <a:r>
+              <a:rPr lang="en-US" sz="1050" dirty="0">
+                <a:solidFill>
+                  <a:schemeClr val="bg1"/>
+                </a:solidFill>
+              </a:rPr>
+              <a:t>&lt;&lt;interface&gt;&gt;</a:t>
+            </a:r>
+          </a:p>
+          <a:p>
+            <a:pPr algn="ctr"/>
+            <a:r>
+              <a:rPr lang="en-US" sz="1050" dirty="0" err="1">
+                <a:solidFill>
+                  <a:schemeClr val="bg1"/>
+                </a:solidFill>
+              </a:rPr>
+              <a:t>AliasStorage</a:t>
+            </a:r>
+            <a:endParaRPr lang="en-SG" sz="1050" dirty="0">
+              <a:solidFill>
+                <a:schemeClr val="bg1"/>
+              </a:solidFill>
+            </a:endParaRPr>
+          </a:p>
+        </p:txBody>
+      </p:sp>
+      <p:sp>
+        <p:nvSpPr>
+          <p:cNvPr id="29" name="Isosceles Triangle 102">
+            <a:extLst>
+              <a:ext uri="{FF2B5EF4-FFF2-40B4-BE49-F238E27FC236}">
+                <a16:creationId xmlns:a16="http://schemas.microsoft.com/office/drawing/2014/main" id="{1C75D1C2-C5EB-BA4D-B490-B8616DDAE56A}"/>
+              </a:ext>
+            </a:extLst>
+          </p:cNvPr>
+          <p:cNvSpPr/>
+          <p:nvPr/>
+        </p:nvSpPr>
+        <p:spPr>
+          <a:xfrm rot="16200000">
+            <a:off x="1656143" y="979986"/>
+            <a:ext cx="240279" cy="84719"/>
+          </a:xfrm>
+          <a:prstGeom prst="triangle">
+            <a:avLst/>
+          </a:prstGeom>
+          <a:solidFill>
+            <a:schemeClr val="accent6">
+              <a:lumMod val="75000"/>
+            </a:schemeClr>
+          </a:solidFill>
+          <a:ln w="19050">
+            <a:solidFill>
+              <a:schemeClr val="accent6">
+                <a:lumMod val="75000"/>
+              </a:schemeClr>
+            </a:solidFill>
+          </a:ln>
+          <a:effectLst/>
+        </p:spPr>
+        <p:style>
+          <a:lnRef idx="1">
+            <a:schemeClr val="accent2"/>
+          </a:lnRef>
+          <a:fillRef idx="2">
+            <a:schemeClr val="accent2"/>
+          </a:fillRef>
+          <a:effectRef idx="1">
+            <a:schemeClr val="accent2"/>
+          </a:effectRef>
+          <a:fontRef idx="minor">
+            <a:schemeClr val="dk1"/>
+          </a:fontRef>
+        </p:style>
+        <p:txBody>
+          <a:bodyPr rtlCol="0" anchor="ctr"/>
+          <a:lstStyle/>
+          <a:p>
+            <a:pPr algn="ctr"/>
+            <a:endParaRPr lang="en-SG" sz="1050">
+              <a:solidFill>
+                <a:schemeClr val="bg1"/>
+              </a:solidFill>
+            </a:endParaRPr>
+          </a:p>
+        </p:txBody>
+      </p:sp>
+      <p:cxnSp>
+        <p:nvCxnSpPr>
+          <p:cNvPr id="30" name="Straight Connector 29">
+            <a:extLst>
+              <a:ext uri="{FF2B5EF4-FFF2-40B4-BE49-F238E27FC236}">
+                <a16:creationId xmlns:a16="http://schemas.microsoft.com/office/drawing/2014/main" id="{7DEEB095-7D09-9F4C-A867-943A89CAF376}"/>
+              </a:ext>
+            </a:extLst>
+          </p:cNvPr>
+          <p:cNvCxnSpPr>
+            <a:cxnSpLocks/>
+            <a:stCxn id="29" idx="3"/>
+          </p:cNvCxnSpPr>
+          <p:nvPr/>
+        </p:nvCxnSpPr>
+        <p:spPr>
+          <a:xfrm>
+            <a:off x="1818642" y="1022345"/>
+            <a:ext cx="108002" cy="0"/>
+          </a:xfrm>
+          <a:prstGeom prst="line">
+            <a:avLst/>
+          </a:prstGeom>
+          <a:ln w="19050">
+            <a:solidFill>
+              <a:schemeClr val="accent6">
+                <a:lumMod val="75000"/>
+              </a:schemeClr>
+            </a:solidFill>
+            <a:prstDash val="sysDot"/>
+            <a:headEnd type="none" w="med" len="med"/>
+            <a:tailEnd type="none" w="med" len="med"/>
+          </a:ln>
+          <a:effectLst/>
+        </p:spPr>
+        <p:style>
+          <a:lnRef idx="1">
+            <a:schemeClr val="accent2"/>
+          </a:lnRef>
+          <a:fillRef idx="2">
+            <a:schemeClr val="accent2"/>
+          </a:fillRef>
+          <a:effectRef idx="1">
+            <a:schemeClr val="accent2"/>
+          </a:effectRef>
+          <a:fontRef idx="minor">
+            <a:schemeClr val="dk1"/>
+          </a:fontRef>
+        </p:style>
+      </p:cxnSp>
+      <p:sp>
+        <p:nvSpPr>
+          <p:cNvPr id="33" name="Rectangle 62">
+            <a:extLst>
+              <a:ext uri="{FF2B5EF4-FFF2-40B4-BE49-F238E27FC236}">
+                <a16:creationId xmlns:a16="http://schemas.microsoft.com/office/drawing/2014/main" id="{BAB300BC-4880-6845-A250-D86421E674EA}"/>
+              </a:ext>
+            </a:extLst>
+          </p:cNvPr>
+          <p:cNvSpPr/>
+          <p:nvPr/>
+        </p:nvSpPr>
+        <p:spPr>
+          <a:xfrm rot="16200000">
+            <a:off x="1396052" y="865571"/>
+            <a:ext cx="1361489" cy="256688"/>
+          </a:xfrm>
+          <a:prstGeom prst="rect">
+            <a:avLst/>
+          </a:prstGeom>
+          <a:solidFill>
+            <a:schemeClr val="accent6">
+              <a:lumMod val="75000"/>
+            </a:schemeClr>
+          </a:solidFill>
+          <a:ln w="19050">
+            <a:solidFill>
+              <a:schemeClr val="accent6">
+                <a:lumMod val="75000"/>
+              </a:schemeClr>
+            </a:solidFill>
+          </a:ln>
+          <a:effectLst/>
+        </p:spPr>
+        <p:style>
+          <a:lnRef idx="1">
+            <a:schemeClr val="accent2"/>
+          </a:lnRef>
+          <a:fillRef idx="2">
+            <a:schemeClr val="accent2"/>
+          </a:fillRef>
+          <a:effectRef idx="1">
+            <a:schemeClr val="accent2"/>
+          </a:effectRef>
+          <a:fontRef idx="minor">
+            <a:schemeClr val="dk1"/>
+          </a:fontRef>
+        </p:style>
+        <p:txBody>
+          <a:bodyPr rtlCol="0" anchor="ctr"/>
+          <a:lstStyle/>
+          <a:p>
+            <a:pPr algn="ctr"/>
+            <a:r>
+              <a:rPr lang="en-US" sz="1050" dirty="0" err="1">
+                <a:solidFill>
+                  <a:schemeClr val="bg1"/>
+                </a:solidFill>
+              </a:rPr>
+              <a:t>ConcreteAliasStorage</a:t>
+            </a:r>
+            <a:endParaRPr lang="en-SG" sz="1050" dirty="0">
+              <a:solidFill>
+                <a:schemeClr val="bg1"/>
+              </a:solidFill>
+            </a:endParaRPr>
+          </a:p>
+        </p:txBody>
+      </p:sp>
+      <p:sp>
+        <p:nvSpPr>
+          <p:cNvPr id="34" name="Rectangle 62">
+            <a:extLst>
+              <a:ext uri="{FF2B5EF4-FFF2-40B4-BE49-F238E27FC236}">
+                <a16:creationId xmlns:a16="http://schemas.microsoft.com/office/drawing/2014/main" id="{2618F27E-3BB2-AC4F-8CDA-F181F2B566CD}"/>
+              </a:ext>
+            </a:extLst>
+          </p:cNvPr>
+          <p:cNvSpPr/>
+          <p:nvPr/>
+        </p:nvSpPr>
+        <p:spPr>
+          <a:xfrm>
+            <a:off x="2873943" y="2076906"/>
+            <a:ext cx="1515638" cy="346760"/>
+          </a:xfrm>
+          <a:prstGeom prst="rect">
+            <a:avLst/>
+          </a:prstGeom>
+          <a:solidFill>
+            <a:schemeClr val="accent6">
+              <a:lumMod val="75000"/>
+            </a:schemeClr>
+          </a:solidFill>
+          <a:ln w="19050">
+            <a:solidFill>
+              <a:schemeClr val="accent6">
+                <a:lumMod val="75000"/>
+              </a:schemeClr>
+            </a:solidFill>
+          </a:ln>
+          <a:effectLst/>
+        </p:spPr>
+        <p:style>
+          <a:lnRef idx="1">
+            <a:schemeClr val="accent2"/>
+          </a:lnRef>
+          <a:fillRef idx="2">
+            <a:schemeClr val="accent2"/>
+          </a:fillRef>
+          <a:effectRef idx="1">
+            <a:schemeClr val="accent2"/>
+          </a:effectRef>
+          <a:fontRef idx="minor">
+            <a:schemeClr val="dk1"/>
+          </a:fontRef>
+        </p:style>
+        <p:txBody>
+          <a:bodyPr rtlCol="0" anchor="ctr"/>
+          <a:lstStyle/>
+          <a:p>
+            <a:pPr algn="ctr"/>
+            <a:r>
+              <a:rPr lang="en-US" sz="1050" dirty="0">
+                <a:solidFill>
+                  <a:schemeClr val="bg1"/>
+                </a:solidFill>
+              </a:rPr>
+              <a:t>&lt;&lt;interface&gt;&gt;</a:t>
+            </a:r>
+          </a:p>
+          <a:p>
+            <a:pPr algn="ctr"/>
+            <a:r>
+              <a:rPr lang="en-US" sz="1050" dirty="0" err="1">
+                <a:solidFill>
+                  <a:schemeClr val="bg1"/>
+                </a:solidFill>
+              </a:rPr>
+              <a:t>DeletedSourcesStorage</a:t>
+            </a:r>
+            <a:endParaRPr lang="en-SG" sz="1050" dirty="0">
+              <a:solidFill>
+                <a:schemeClr val="bg1"/>
+              </a:solidFill>
+            </a:endParaRPr>
+          </a:p>
+        </p:txBody>
+      </p:sp>
+      <p:sp>
+        <p:nvSpPr>
+          <p:cNvPr id="36" name="Isosceles Triangle 102">
+            <a:extLst>
+              <a:ext uri="{FF2B5EF4-FFF2-40B4-BE49-F238E27FC236}">
+                <a16:creationId xmlns:a16="http://schemas.microsoft.com/office/drawing/2014/main" id="{03E0C6E9-6F93-7D40-A3AE-5939D60905B4}"/>
+              </a:ext>
+            </a:extLst>
+          </p:cNvPr>
+          <p:cNvSpPr/>
+          <p:nvPr/>
+        </p:nvSpPr>
+        <p:spPr>
+          <a:xfrm rot="16200000">
+            <a:off x="4306800" y="2178252"/>
+            <a:ext cx="305094" cy="144067"/>
+          </a:xfrm>
+          <a:prstGeom prst="triangle">
+            <a:avLst/>
+          </a:prstGeom>
+          <a:solidFill>
+            <a:schemeClr val="accent6">
+              <a:lumMod val="75000"/>
+            </a:schemeClr>
+          </a:solidFill>
+          <a:ln w="19050">
+            <a:solidFill>
+              <a:schemeClr val="accent6">
+                <a:lumMod val="75000"/>
+              </a:schemeClr>
+            </a:solidFill>
+          </a:ln>
+          <a:effectLst/>
+        </p:spPr>
+        <p:style>
+          <a:lnRef idx="1">
+            <a:schemeClr val="accent2"/>
+          </a:lnRef>
+          <a:fillRef idx="2">
+            <a:schemeClr val="accent2"/>
+          </a:fillRef>
+          <a:effectRef idx="1">
+            <a:schemeClr val="accent2"/>
+          </a:effectRef>
+          <a:fontRef idx="minor">
+            <a:schemeClr val="dk1"/>
+          </a:fontRef>
+        </p:style>
+        <p:txBody>
+          <a:bodyPr rtlCol="0" anchor="ctr"/>
+          <a:lstStyle/>
+          <a:p>
+            <a:pPr algn="ctr"/>
+            <a:endParaRPr lang="en-SG" sz="1050">
+              <a:solidFill>
+                <a:schemeClr val="bg1"/>
+              </a:solidFill>
+            </a:endParaRPr>
+          </a:p>
+        </p:txBody>
+      </p:sp>
+      <p:cxnSp>
+        <p:nvCxnSpPr>
+          <p:cNvPr id="37" name="Straight Connector 36">
+            <a:extLst>
+              <a:ext uri="{FF2B5EF4-FFF2-40B4-BE49-F238E27FC236}">
+                <a16:creationId xmlns:a16="http://schemas.microsoft.com/office/drawing/2014/main" id="{D1D604EA-0886-944E-BD16-02DA2E921E6B}"/>
+              </a:ext>
+            </a:extLst>
+          </p:cNvPr>
+          <p:cNvCxnSpPr>
+            <a:cxnSpLocks/>
+          </p:cNvCxnSpPr>
+          <p:nvPr/>
+        </p:nvCxnSpPr>
+        <p:spPr>
+          <a:xfrm flipH="1">
+            <a:off x="4521618" y="2260707"/>
+            <a:ext cx="193020" cy="0"/>
+          </a:xfrm>
+          <a:prstGeom prst="line">
+            <a:avLst/>
+          </a:prstGeom>
+          <a:ln w="19050">
+            <a:solidFill>
+              <a:schemeClr val="accent6">
+                <a:lumMod val="75000"/>
+              </a:schemeClr>
+            </a:solidFill>
+            <a:prstDash val="sysDot"/>
+            <a:headEnd type="none" w="med" len="med"/>
+            <a:tailEnd type="none" w="med" len="med"/>
+          </a:ln>
+          <a:effectLst/>
+        </p:spPr>
+        <p:style>
+          <a:lnRef idx="1">
+            <a:schemeClr val="accent2"/>
+          </a:lnRef>
+          <a:fillRef idx="2">
+            <a:schemeClr val="accent2"/>
+          </a:fillRef>
+          <a:effectRef idx="1">
+            <a:schemeClr val="accent2"/>
+          </a:effectRef>
+          <a:fontRef idx="minor">
+            <a:schemeClr val="dk1"/>
+          </a:fontRef>
+        </p:style>
+      </p:cxnSp>
+      <p:sp>
+        <p:nvSpPr>
+          <p:cNvPr id="39" name="Rectangle 62">
+            <a:extLst>
+              <a:ext uri="{FF2B5EF4-FFF2-40B4-BE49-F238E27FC236}">
+                <a16:creationId xmlns:a16="http://schemas.microsoft.com/office/drawing/2014/main" id="{0A44165A-1952-5F4A-888F-1EF8AAAEED89}"/>
+              </a:ext>
+            </a:extLst>
+          </p:cNvPr>
+          <p:cNvSpPr/>
+          <p:nvPr/>
+        </p:nvSpPr>
+        <p:spPr>
+          <a:xfrm>
+            <a:off x="4747667" y="2139208"/>
+            <a:ext cx="1507758" cy="284457"/>
+          </a:xfrm>
+          <a:prstGeom prst="rect">
+            <a:avLst/>
+          </a:prstGeom>
+          <a:solidFill>
+            <a:schemeClr val="accent6">
+              <a:lumMod val="75000"/>
+            </a:schemeClr>
+          </a:solidFill>
+          <a:ln w="19050">
+            <a:solidFill>
+              <a:schemeClr val="accent6">
+                <a:lumMod val="75000"/>
+              </a:schemeClr>
+            </a:solidFill>
+          </a:ln>
+          <a:effectLst/>
+        </p:spPr>
+        <p:style>
+          <a:lnRef idx="1">
+            <a:schemeClr val="accent2"/>
+          </a:lnRef>
+          <a:fillRef idx="2">
+            <a:schemeClr val="accent2"/>
+          </a:fillRef>
+          <a:effectRef idx="1">
+            <a:schemeClr val="accent2"/>
+          </a:effectRef>
+          <a:fontRef idx="minor">
+            <a:schemeClr val="dk1"/>
+          </a:fontRef>
+        </p:style>
+        <p:txBody>
+          <a:bodyPr rtlCol="0" anchor="ctr"/>
+          <a:lstStyle/>
+          <a:p>
+            <a:pPr algn="ctr"/>
+            <a:r>
+              <a:rPr lang="en-US" sz="1050" dirty="0" err="1">
+                <a:solidFill>
+                  <a:schemeClr val="bg1"/>
+                </a:solidFill>
+              </a:rPr>
+              <a:t>Json</a:t>
+            </a:r>
+            <a:r>
+              <a:rPr lang="en-US" sz="1050" dirty="0">
+                <a:solidFill>
+                  <a:schemeClr val="bg1"/>
+                </a:solidFill>
+              </a:rPr>
+              <a:t> </a:t>
+            </a:r>
+            <a:r>
+              <a:rPr lang="en-US" sz="1050" dirty="0" err="1">
+                <a:solidFill>
+                  <a:schemeClr val="bg1"/>
+                </a:solidFill>
+              </a:rPr>
+              <a:t>DeletedSourcesStorage</a:t>
+            </a:r>
+            <a:endParaRPr lang="en-SG" sz="1050" dirty="0">
+              <a:solidFill>
+                <a:schemeClr val="bg1"/>
+              </a:solidFill>
+            </a:endParaRPr>
+          </a:p>
+        </p:txBody>
+      </p:sp>
+      <p:cxnSp>
+        <p:nvCxnSpPr>
+          <p:cNvPr id="44" name="Elbow Connector 122">
+            <a:extLst>
+              <a:ext uri="{FF2B5EF4-FFF2-40B4-BE49-F238E27FC236}">
+                <a16:creationId xmlns:a16="http://schemas.microsoft.com/office/drawing/2014/main" id="{A037142C-E7FC-0542-98E7-45CABFA895B0}"/>
+              </a:ext>
+            </a:extLst>
+          </p:cNvPr>
+          <p:cNvCxnSpPr>
+            <a:cxnSpLocks/>
+          </p:cNvCxnSpPr>
+          <p:nvPr/>
+        </p:nvCxnSpPr>
+        <p:spPr>
+          <a:xfrm flipV="1">
+            <a:off x="6243651" y="2277637"/>
+            <a:ext cx="254248" cy="30979"/>
+          </a:xfrm>
+          <a:prstGeom prst="bentConnector3">
+            <a:avLst>
+              <a:gd name="adj1" fmla="val -38"/>
+            </a:avLst>
+          </a:prstGeom>
+          <a:ln w="19050">
+            <a:solidFill>
+              <a:schemeClr val="accent6">
+                <a:lumMod val="75000"/>
+              </a:schemeClr>
+            </a:solidFill>
+            <a:prstDash val="sysDot"/>
+            <a:headEnd type="none" w="med" len="med"/>
+            <a:tailEnd type="arrow" w="med" len="med"/>
+          </a:ln>
+          <a:effectLst/>
+        </p:spPr>
+        <p:style>
+          <a:lnRef idx="1">
+            <a:schemeClr val="accent2"/>
+          </a:lnRef>
+          <a:fillRef idx="2">
+            <a:schemeClr val="accent2"/>
+          </a:fillRef>
+          <a:effectRef idx="1">
+            <a:schemeClr val="accent2"/>
+          </a:effectRef>
+          <a:fontRef idx="minor">
+            <a:schemeClr val="dk1"/>
+          </a:fontRef>
+        </p:style>
+      </p:cxnSp>
+      <p:sp>
+        <p:nvSpPr>
+          <p:cNvPr id="45" name="Rectangle 8">
+            <a:extLst>
+              <a:ext uri="{FF2B5EF4-FFF2-40B4-BE49-F238E27FC236}">
+                <a16:creationId xmlns:a16="http://schemas.microsoft.com/office/drawing/2014/main" id="{A919EC63-A8AC-374C-AAD9-5212CEC28D3A}"/>
+              </a:ext>
+            </a:extLst>
+          </p:cNvPr>
+          <p:cNvSpPr/>
+          <p:nvPr/>
+        </p:nvSpPr>
+        <p:spPr>
+          <a:xfrm>
+            <a:off x="6510189" y="2087102"/>
+            <a:ext cx="1200707" cy="346760"/>
+          </a:xfrm>
+          <a:prstGeom prst="rect">
+            <a:avLst/>
+          </a:prstGeom>
+          <a:ln w="19050"/>
+          <a:effectLst/>
+        </p:spPr>
+        <p:style>
+          <a:lnRef idx="1">
+            <a:schemeClr val="accent6"/>
+          </a:lnRef>
+          <a:fillRef idx="2">
+            <a:schemeClr val="accent6"/>
+          </a:fillRef>
+          <a:effectRef idx="1">
+            <a:schemeClr val="accent6"/>
+          </a:effectRef>
+          <a:fontRef idx="minor">
+            <a:schemeClr val="dk1"/>
+          </a:fontRef>
+        </p:style>
+        <p:txBody>
+          <a:bodyPr rtlCol="0" anchor="ctr"/>
+          <a:lstStyle/>
+          <a:p>
+            <a:pPr algn="ctr"/>
+            <a:r>
+              <a:rPr lang="en-US" sz="1050" b="1" dirty="0" err="1">
+                <a:solidFill>
+                  <a:schemeClr val="accent6">
+                    <a:lumMod val="75000"/>
+                  </a:schemeClr>
+                </a:solidFill>
+              </a:rPr>
+              <a:t>JsonSerializable</a:t>
+            </a:r>
+            <a:br>
+              <a:rPr lang="en-US" sz="1050" b="1" dirty="0">
+                <a:solidFill>
+                  <a:schemeClr val="accent6">
+                    <a:lumMod val="75000"/>
+                  </a:schemeClr>
+                </a:solidFill>
+              </a:rPr>
+            </a:br>
+            <a:r>
+              <a:rPr lang="en-US" sz="1050" b="1" dirty="0" err="1">
+                <a:solidFill>
+                  <a:schemeClr val="accent6">
+                    <a:lumMod val="75000"/>
+                  </a:schemeClr>
+                </a:solidFill>
+              </a:rPr>
+              <a:t>DeletedSources</a:t>
+            </a:r>
+            <a:endParaRPr lang="en-SG" sz="1050" b="1" dirty="0">
+              <a:solidFill>
+                <a:schemeClr val="accent6">
+                  <a:lumMod val="75000"/>
+                </a:schemeClr>
+              </a:solidFill>
+            </a:endParaRPr>
+          </a:p>
+        </p:txBody>
+      </p:sp>
+      <p:sp>
+        <p:nvSpPr>
+          <p:cNvPr id="46" name="Rectangle 62">
+            <a:extLst>
+              <a:ext uri="{FF2B5EF4-FFF2-40B4-BE49-F238E27FC236}">
+                <a16:creationId xmlns:a16="http://schemas.microsoft.com/office/drawing/2014/main" id="{428A2F15-EEE8-1843-B5F8-760B82534E7F}"/>
+              </a:ext>
+            </a:extLst>
+          </p:cNvPr>
+          <p:cNvSpPr/>
+          <p:nvPr/>
+        </p:nvSpPr>
+        <p:spPr>
+          <a:xfrm rot="16200000">
+            <a:off x="2550068" y="925146"/>
+            <a:ext cx="1515638" cy="346761"/>
+          </a:xfrm>
+          <a:prstGeom prst="rect">
+            <a:avLst/>
+          </a:prstGeom>
+          <a:solidFill>
+            <a:schemeClr val="accent6">
+              <a:lumMod val="75000"/>
+            </a:schemeClr>
+          </a:solidFill>
+          <a:ln w="19050">
+            <a:solidFill>
+              <a:schemeClr val="accent6">
+                <a:lumMod val="75000"/>
+              </a:schemeClr>
+            </a:solidFill>
+          </a:ln>
+          <a:effectLst/>
+        </p:spPr>
+        <p:style>
+          <a:lnRef idx="1">
+            <a:schemeClr val="accent2"/>
+          </a:lnRef>
+          <a:fillRef idx="2">
+            <a:schemeClr val="accent2"/>
+          </a:fillRef>
+          <a:effectRef idx="1">
+            <a:schemeClr val="accent2"/>
+          </a:effectRef>
+          <a:fontRef idx="minor">
+            <a:schemeClr val="dk1"/>
+          </a:fontRef>
+        </p:style>
+        <p:txBody>
+          <a:bodyPr rtlCol="0" anchor="ctr"/>
+          <a:lstStyle/>
+          <a:p>
+            <a:pPr algn="ctr"/>
+            <a:r>
+              <a:rPr lang="en-US" sz="1050" dirty="0" err="1">
+                <a:solidFill>
+                  <a:schemeClr val="bg1"/>
+                </a:solidFill>
+              </a:rPr>
+              <a:t>PinnedSourcesStorageOperationCentre</a:t>
+            </a:r>
+            <a:endParaRPr lang="en-SG" sz="1050" dirty="0">
+              <a:solidFill>
+                <a:schemeClr val="bg1"/>
+              </a:solidFill>
+            </a:endParaRPr>
+          </a:p>
+        </p:txBody>
+      </p:sp>
+      <p:pic>
+        <p:nvPicPr>
+          <p:cNvPr id="8" name="Picture 7">
+            <a:extLst>
+              <a:ext uri="{FF2B5EF4-FFF2-40B4-BE49-F238E27FC236}">
+                <a16:creationId xmlns:a16="http://schemas.microsoft.com/office/drawing/2014/main" id="{BF089999-0E7A-7148-A6E2-7AB562604D34}"/>
+              </a:ext>
+            </a:extLst>
+          </p:cNvPr>
+          <p:cNvPicPr>
+            <a:picLocks noChangeAspect="1"/>
+          </p:cNvPicPr>
+          <p:nvPr/>
+        </p:nvPicPr>
+        <p:blipFill>
+          <a:blip r:embed="rId2"/>
+          <a:stretch>
+            <a:fillRect/>
+          </a:stretch>
+        </p:blipFill>
+        <p:spPr>
+          <a:xfrm>
+            <a:off x="2402996" y="2139832"/>
+            <a:ext cx="596900" cy="241300"/>
+          </a:xfrm>
+          <a:prstGeom prst="rect">
+            <a:avLst/>
+          </a:prstGeom>
+        </p:spPr>
+      </p:pic>
+      <p:cxnSp>
+        <p:nvCxnSpPr>
+          <p:cNvPr id="62" name="Elbow Connector 122">
+            <a:extLst>
+              <a:ext uri="{FF2B5EF4-FFF2-40B4-BE49-F238E27FC236}">
+                <a16:creationId xmlns:a16="http://schemas.microsoft.com/office/drawing/2014/main" id="{2BB37A5D-6480-0D4E-9EA2-4982B6C19DCC}"/>
+              </a:ext>
+            </a:extLst>
+          </p:cNvPr>
+          <p:cNvCxnSpPr>
+            <a:cxnSpLocks/>
+          </p:cNvCxnSpPr>
+          <p:nvPr/>
+        </p:nvCxnSpPr>
+        <p:spPr>
+          <a:xfrm>
+            <a:off x="1086818" y="965456"/>
+            <a:ext cx="269220" cy="12700"/>
+          </a:xfrm>
+          <a:prstGeom prst="bentConnector3">
+            <a:avLst>
+              <a:gd name="adj1" fmla="val 50000"/>
+            </a:avLst>
+          </a:prstGeom>
+          <a:ln w="19050">
+            <a:solidFill>
+              <a:schemeClr val="bg1">
+                <a:lumMod val="75000"/>
+              </a:schemeClr>
+            </a:solidFill>
+            <a:prstDash val="sysDot"/>
+            <a:headEnd type="none" w="med" len="med"/>
+            <a:tailEnd type="arrow" w="med" len="med"/>
+          </a:ln>
+          <a:effectLst/>
+        </p:spPr>
+        <p:style>
+          <a:lnRef idx="1">
+            <a:schemeClr val="accent2"/>
+          </a:lnRef>
+          <a:fillRef idx="2">
+            <a:schemeClr val="accent2"/>
+          </a:fillRef>
+          <a:effectRef idx="1">
+            <a:schemeClr val="accent2"/>
+          </a:effectRef>
+          <a:fontRef idx="minor">
+            <a:schemeClr val="dk1"/>
+          </a:fontRef>
+        </p:style>
+      </p:cxnSp>
+      <p:cxnSp>
+        <p:nvCxnSpPr>
+          <p:cNvPr id="63" name="Elbow Connector 122">
+            <a:extLst>
+              <a:ext uri="{FF2B5EF4-FFF2-40B4-BE49-F238E27FC236}">
+                <a16:creationId xmlns:a16="http://schemas.microsoft.com/office/drawing/2014/main" id="{B25E1896-D7F9-F443-A616-F799BA88B6E0}"/>
+              </a:ext>
+            </a:extLst>
+          </p:cNvPr>
+          <p:cNvCxnSpPr>
+            <a:cxnSpLocks/>
+          </p:cNvCxnSpPr>
+          <p:nvPr/>
+        </p:nvCxnSpPr>
+        <p:spPr>
+          <a:xfrm>
+            <a:off x="2865286" y="1015093"/>
+            <a:ext cx="269220" cy="12700"/>
+          </a:xfrm>
+          <a:prstGeom prst="bentConnector3">
+            <a:avLst>
+              <a:gd name="adj1" fmla="val 50000"/>
+            </a:avLst>
+          </a:prstGeom>
+          <a:ln w="19050">
+            <a:solidFill>
+              <a:schemeClr val="bg1">
+                <a:lumMod val="75000"/>
+              </a:schemeClr>
+            </a:solidFill>
+            <a:prstDash val="sysDot"/>
+            <a:headEnd type="none" w="med" len="med"/>
+            <a:tailEnd type="arrow" w="med" len="med"/>
+          </a:ln>
+          <a:effectLst/>
+        </p:spPr>
+        <p:style>
+          <a:lnRef idx="1">
+            <a:schemeClr val="accent2"/>
+          </a:lnRef>
+          <a:fillRef idx="2">
+            <a:schemeClr val="accent2"/>
+          </a:fillRef>
+          <a:effectRef idx="1">
+            <a:schemeClr val="accent2"/>
           </a:effectRef>
           <a:fontRef idx="minor">
             <a:schemeClr val="dk1"/>

</xml_diff>